<commit_message>
SG2665 AR.CORE Immersive Graph in 3D - Hololens Final Commit (Paper, My final slides for group presentation, video links are provided in the slides (2x videos ~7.00 minutes), and all code)
</commit_message>
<xml_diff>
--- a/Presentations/EECS6895-AdvancedBigDataAnalytics- Final-SG2665.pptx
+++ b/Presentations/EECS6895-AdvancedBigDataAnalytics- Final-SG2665.pptx
@@ -586,7 +586,7 @@
           </a:ln>
           <a:extLst>
             <a:ext uri="{C572A759-6A51-4108-AA02-DFA0A04FC94B}">
-              <ma14:wrappingTextBoxFlag xmlns="" xmlns:ma14="http://schemas.microsoft.com/office/mac/drawingml/2011/main" val="1"/>
+              <ma14:wrappingTextBoxFlag xmlns:ma14="http://schemas.microsoft.com/office/mac/drawingml/2011/main" xmlns="" val="1"/>
             </a:ext>
           </a:extLst>
         </p:spPr>
@@ -696,7 +696,7 @@
           </a:ln>
           <a:extLst>
             <a:ext uri="{C572A759-6A51-4108-AA02-DFA0A04FC94B}">
-              <ma14:wrappingTextBoxFlag xmlns="" xmlns:ma14="http://schemas.microsoft.com/office/mac/drawingml/2011/main" val="1"/>
+              <ma14:wrappingTextBoxFlag xmlns:ma14="http://schemas.microsoft.com/office/mac/drawingml/2011/main" xmlns="" val="1"/>
             </a:ext>
           </a:extLst>
         </p:spPr>
@@ -1027,7 +1027,7 @@
           </a:ln>
           <a:extLst>
             <a:ext uri="{C572A759-6A51-4108-AA02-DFA0A04FC94B}">
-              <ma14:wrappingTextBoxFlag xmlns="" xmlns:ma14="http://schemas.microsoft.com/office/mac/drawingml/2011/main" val="1"/>
+              <ma14:wrappingTextBoxFlag xmlns:ma14="http://schemas.microsoft.com/office/mac/drawingml/2011/main" xmlns="" val="1"/>
             </a:ext>
           </a:extLst>
         </p:spPr>
@@ -1105,7 +1105,7 @@
           </a:ln>
           <a:extLst>
             <a:ext uri="{C572A759-6A51-4108-AA02-DFA0A04FC94B}">
-              <ma14:wrappingTextBoxFlag xmlns="" xmlns:ma14="http://schemas.microsoft.com/office/mac/drawingml/2011/main" val="1"/>
+              <ma14:wrappingTextBoxFlag xmlns:ma14="http://schemas.microsoft.com/office/mac/drawingml/2011/main" xmlns="" val="1"/>
             </a:ext>
           </a:extLst>
         </p:spPr>
@@ -1837,7 +1837,7 @@
           </a:ln>
           <a:extLst>
             <a:ext uri="{C572A759-6A51-4108-AA02-DFA0A04FC94B}">
-              <ma14:wrappingTextBoxFlag xmlns="" xmlns:ma14="http://schemas.microsoft.com/office/mac/drawingml/2011/main" val="1"/>
+              <ma14:wrappingTextBoxFlag xmlns:ma14="http://schemas.microsoft.com/office/mac/drawingml/2011/main" xmlns="" val="1"/>
             </a:ext>
           </a:extLst>
         </p:spPr>
@@ -1947,7 +1947,7 @@
           </a:ln>
           <a:extLst>
             <a:ext uri="{C572A759-6A51-4108-AA02-DFA0A04FC94B}">
-              <ma14:wrappingTextBoxFlag xmlns="" xmlns:ma14="http://schemas.microsoft.com/office/mac/drawingml/2011/main" val="1"/>
+              <ma14:wrappingTextBoxFlag xmlns:ma14="http://schemas.microsoft.com/office/mac/drawingml/2011/main" xmlns="" val="1"/>
             </a:ext>
           </a:extLst>
         </p:spPr>
@@ -2106,7 +2106,7 @@
           </a:ln>
           <a:extLst>
             <a:ext uri="{C572A759-6A51-4108-AA02-DFA0A04FC94B}">
-              <ma14:wrappingTextBoxFlag xmlns="" xmlns:ma14="http://schemas.microsoft.com/office/mac/drawingml/2011/main" val="1"/>
+              <ma14:wrappingTextBoxFlag xmlns:ma14="http://schemas.microsoft.com/office/mac/drawingml/2011/main" xmlns="" val="1"/>
             </a:ext>
           </a:extLst>
         </p:spPr>
@@ -2143,7 +2143,7 @@
           </a:ln>
           <a:extLst>
             <a:ext uri="{C572A759-6A51-4108-AA02-DFA0A04FC94B}">
-              <ma14:wrappingTextBoxFlag xmlns="" xmlns:ma14="http://schemas.microsoft.com/office/mac/drawingml/2011/main" val="1"/>
+              <ma14:wrappingTextBoxFlag xmlns:ma14="http://schemas.microsoft.com/office/mac/drawingml/2011/main" xmlns="" val="1"/>
             </a:ext>
           </a:extLst>
         </p:spPr>
@@ -3239,7 +3239,7 @@
           </a:ln>
           <a:extLst>
             <a:ext uri="{C572A759-6A51-4108-AA02-DFA0A04FC94B}">
-              <ma14:wrappingTextBoxFlag xmlns="" xmlns:ma14="http://schemas.microsoft.com/office/mac/drawingml/2011/main" val="1"/>
+              <ma14:wrappingTextBoxFlag xmlns:ma14="http://schemas.microsoft.com/office/mac/drawingml/2011/main" xmlns="" val="1"/>
             </a:ext>
           </a:extLst>
         </p:spPr>
@@ -3458,7 +3458,7 @@
           </a:ln>
           <a:extLst>
             <a:ext uri="{C572A759-6A51-4108-AA02-DFA0A04FC94B}">
-              <ma14:wrappingTextBoxFlag xmlns="" xmlns:ma14="http://schemas.microsoft.com/office/mac/drawingml/2011/main" val="1"/>
+              <ma14:wrappingTextBoxFlag xmlns:ma14="http://schemas.microsoft.com/office/mac/drawingml/2011/main" xmlns="" val="1"/>
             </a:ext>
           </a:extLst>
         </p:spPr>
@@ -3669,7 +3669,7 @@
           </a:prstGeom>
           <a:extLst>
             <a:ext uri="{C572A759-6A51-4108-AA02-DFA0A04FC94B}">
-              <ma14:wrappingTextBoxFlag xmlns="" xmlns:ma14="http://schemas.microsoft.com/office/mac/drawingml/2011/main" val="1"/>
+              <ma14:wrappingTextBoxFlag xmlns:ma14="http://schemas.microsoft.com/office/mac/drawingml/2011/main" xmlns="" val="1"/>
             </a:ext>
           </a:extLst>
         </p:spPr>
@@ -7645,7 +7645,7 @@
           </a:prstGeom>
           <a:extLst>
             <a:ext uri="{C572A759-6A51-4108-AA02-DFA0A04FC94B}">
-              <ma14:wrappingTextBoxFlag xmlns="" xmlns:ma14="http://schemas.microsoft.com/office/mac/drawingml/2011/main" val="1"/>
+              <ma14:wrappingTextBoxFlag xmlns:ma14="http://schemas.microsoft.com/office/mac/drawingml/2011/main" xmlns="" val="1"/>
             </a:ext>
           </a:extLst>
         </p:spPr>

</xml_diff>